<commit_message>
Work on fixing runtime errors
</commit_message>
<xml_diff>
--- a/Magic Beans Demo Presentation.pptx
+++ b/Magic Beans Demo Presentation.pptx
@@ -11,6 +11,7 @@
     <p:sldId id="259" r:id="rId5"/>
     <p:sldId id="260" r:id="rId6"/>
     <p:sldId id="261" r:id="rId7"/>
+    <p:sldId id="262" r:id="rId8"/>
   </p:sldIdLst>
   <p:sldSz cx="9144000" cy="6858000" type="screen4x3"/>
   <p:notesSz cx="6858000" cy="9144000"/>
@@ -109,6 +110,22 @@
       </a:defRPr>
     </a:lvl9pPr>
   </p:defaultTextStyle>
+  <p:extLst>
+    <p:ext uri="{EFAFB233-063F-42B5-8137-9DF3F51BA10A}">
+      <p15:sldGuideLst xmlns:p15="http://schemas.microsoft.com/office/powerpoint/2012/main">
+        <p15:guide id="1" orient="horz" pos="2160">
+          <p15:clr>
+            <a:srgbClr val="A4A3A4"/>
+          </p15:clr>
+        </p15:guide>
+        <p15:guide id="2" pos="2880">
+          <p15:clr>
+            <a:srgbClr val="A4A3A4"/>
+          </p15:clr>
+        </p15:guide>
+      </p15:sldGuideLst>
+    </p:ext>
+  </p:extLst>
 </p:presentation>
 </file>
 
@@ -360,7 +377,7 @@
           <a:p>
             <a:fld id="{3661609F-8F97-49A4-B3FB-EEBF89214C0D}" type="datetimeFigureOut">
               <a:rPr lang="en-US" smtClean="0"/>
-              <a:t>12/14/2015</a:t>
+              <a:t>12/15/2015</a:t>
             </a:fld>
             <a:endParaRPr lang="en-US"/>
           </a:p>
@@ -583,7 +600,7 @@
           <a:p>
             <a:fld id="{3661609F-8F97-49A4-B3FB-EEBF89214C0D}" type="datetimeFigureOut">
               <a:rPr lang="en-US" smtClean="0"/>
-              <a:t>12/14/2015</a:t>
+              <a:t>12/15/2015</a:t>
             </a:fld>
             <a:endParaRPr lang="en-US"/>
           </a:p>
@@ -863,7 +880,7 @@
           <a:p>
             <a:fld id="{3661609F-8F97-49A4-B3FB-EEBF89214C0D}" type="datetimeFigureOut">
               <a:rPr lang="en-US" smtClean="0"/>
-              <a:t>12/14/2015</a:t>
+              <a:t>12/15/2015</a:t>
             </a:fld>
             <a:endParaRPr lang="en-US"/>
           </a:p>
@@ -1042,7 +1059,7 @@
           <a:p>
             <a:fld id="{3661609F-8F97-49A4-B3FB-EEBF89214C0D}" type="datetimeFigureOut">
               <a:rPr lang="en-US" smtClean="0"/>
-              <a:t>12/14/2015</a:t>
+              <a:t>12/15/2015</a:t>
             </a:fld>
             <a:endParaRPr lang="en-US"/>
           </a:p>
@@ -1400,7 +1417,7 @@
           <a:p>
             <a:fld id="{3661609F-8F97-49A4-B3FB-EEBF89214C0D}" type="datetimeFigureOut">
               <a:rPr lang="en-US" smtClean="0"/>
-              <a:t>12/14/2015</a:t>
+              <a:t>12/15/2015</a:t>
             </a:fld>
             <a:endParaRPr lang="en-US"/>
           </a:p>
@@ -1687,7 +1704,7 @@
           <a:p>
             <a:fld id="{3661609F-8F97-49A4-B3FB-EEBF89214C0D}" type="datetimeFigureOut">
               <a:rPr lang="en-US" smtClean="0"/>
-              <a:t>12/14/2015</a:t>
+              <a:t>12/15/2015</a:t>
             </a:fld>
             <a:endParaRPr lang="en-US"/>
           </a:p>
@@ -2109,7 +2126,7 @@
           <a:p>
             <a:fld id="{3661609F-8F97-49A4-B3FB-EEBF89214C0D}" type="datetimeFigureOut">
               <a:rPr lang="en-US" smtClean="0"/>
-              <a:t>12/14/2015</a:t>
+              <a:t>12/15/2015</a:t>
             </a:fld>
             <a:endParaRPr lang="en-US"/>
           </a:p>
@@ -2224,7 +2241,7 @@
           <a:p>
             <a:fld id="{3661609F-8F97-49A4-B3FB-EEBF89214C0D}" type="datetimeFigureOut">
               <a:rPr lang="en-US" smtClean="0"/>
-              <a:t>12/14/2015</a:t>
+              <a:t>12/15/2015</a:t>
             </a:fld>
             <a:endParaRPr lang="en-US"/>
           </a:p>
@@ -2314,7 +2331,7 @@
           <a:p>
             <a:fld id="{3661609F-8F97-49A4-B3FB-EEBF89214C0D}" type="datetimeFigureOut">
               <a:rPr lang="en-US" smtClean="0"/>
-              <a:t>12/14/2015</a:t>
+              <a:t>12/15/2015</a:t>
             </a:fld>
             <a:endParaRPr lang="en-US"/>
           </a:p>
@@ -2592,7 +2609,7 @@
           <a:p>
             <a:fld id="{3661609F-8F97-49A4-B3FB-EEBF89214C0D}" type="datetimeFigureOut">
               <a:rPr lang="en-US" smtClean="0"/>
-              <a:t>12/14/2015</a:t>
+              <a:t>12/15/2015</a:t>
             </a:fld>
             <a:endParaRPr lang="en-US"/>
           </a:p>
@@ -2958,7 +2975,7 @@
           <a:p>
             <a:fld id="{3661609F-8F97-49A4-B3FB-EEBF89214C0D}" type="datetimeFigureOut">
               <a:rPr lang="en-US" smtClean="0"/>
-              <a:t>12/14/2015</a:t>
+              <a:t>12/15/2015</a:t>
             </a:fld>
             <a:endParaRPr lang="en-US"/>
           </a:p>
@@ -3395,7 +3412,7 @@
           <a:p>
             <a:fld id="{3661609F-8F97-49A4-B3FB-EEBF89214C0D}" type="datetimeFigureOut">
               <a:rPr lang="en-US" smtClean="0"/>
-              <a:t>12/14/2015</a:t>
+              <a:t>12/15/2015</a:t>
             </a:fld>
             <a:endParaRPr lang="en-US"/>
           </a:p>
@@ -4582,6 +4599,130 @@
 </p:sld>
 </file>
 
+<file path=ppt/slides/slide7.xml><?xml version="1.0" encoding="utf-8"?>
+<p:sld xmlns:a="http://schemas.openxmlformats.org/drawingml/2006/main" xmlns:r="http://schemas.openxmlformats.org/officeDocument/2006/relationships" xmlns:p="http://schemas.openxmlformats.org/presentationml/2006/main">
+  <p:cSld>
+    <p:spTree>
+      <p:nvGrpSpPr>
+        <p:cNvPr id="1" name=""/>
+        <p:cNvGrpSpPr/>
+        <p:nvPr/>
+      </p:nvGrpSpPr>
+      <p:grpSpPr>
+        <a:xfrm>
+          <a:off x="0" y="0"/>
+          <a:ext cx="0" cy="0"/>
+          <a:chOff x="0" y="0"/>
+          <a:chExt cx="0" cy="0"/>
+        </a:xfrm>
+      </p:grpSpPr>
+      <p:sp>
+        <p:nvSpPr>
+          <p:cNvPr id="2" name="Title 1"/>
+          <p:cNvSpPr>
+            <a:spLocks noGrp="1"/>
+          </p:cNvSpPr>
+          <p:nvPr>
+            <p:ph type="title"/>
+          </p:nvPr>
+        </p:nvSpPr>
+        <p:spPr/>
+        <p:txBody>
+          <a:bodyPr/>
+          <a:lstStyle/>
+          <a:p>
+            <a:r>
+              <a:rPr lang="en-US" dirty="0" smtClean="0"/>
+              <a:t>Issues</a:t>
+            </a:r>
+            <a:endParaRPr lang="en-US" dirty="0"/>
+          </a:p>
+        </p:txBody>
+      </p:sp>
+      <p:sp>
+        <p:nvSpPr>
+          <p:cNvPr id="3" name="Content Placeholder 2"/>
+          <p:cNvSpPr>
+            <a:spLocks noGrp="1"/>
+          </p:cNvSpPr>
+          <p:nvPr>
+            <p:ph idx="1"/>
+          </p:nvPr>
+        </p:nvSpPr>
+        <p:spPr/>
+        <p:txBody>
+          <a:bodyPr/>
+          <a:lstStyle/>
+          <a:p>
+            <a:r>
+              <a:rPr lang="en-US" dirty="0" smtClean="0"/>
+              <a:t>Understanding </a:t>
+            </a:r>
+            <a:r>
+              <a:rPr lang="en-US" dirty="0" err="1" smtClean="0"/>
+              <a:t>LaTeX</a:t>
+            </a:r>
+            <a:r>
+              <a:rPr lang="en-US" dirty="0" smtClean="0"/>
+              <a:t>, what it is, how it works</a:t>
+            </a:r>
+          </a:p>
+          <a:p>
+            <a:r>
+              <a:rPr lang="en-US" dirty="0" smtClean="0"/>
+              <a:t>Learning the </a:t>
+            </a:r>
+            <a:r>
+              <a:rPr lang="en-US" dirty="0" err="1" smtClean="0"/>
+              <a:t>Netbeans</a:t>
+            </a:r>
+            <a:r>
+              <a:rPr lang="en-US" dirty="0" smtClean="0"/>
+              <a:t> architecture proved very hard</a:t>
+            </a:r>
+          </a:p>
+          <a:p>
+            <a:r>
+              <a:rPr lang="en-US" dirty="0" smtClean="0"/>
+              <a:t>Because of this choosing an approach was difficult and we had to change directions 3+ times which came with re-learning</a:t>
+            </a:r>
+          </a:p>
+          <a:p>
+            <a:r>
+              <a:rPr lang="en-US" dirty="0" smtClean="0"/>
+              <a:t>Connecting our plugin to </a:t>
+            </a:r>
+            <a:r>
+              <a:rPr lang="en-US" dirty="0" err="1" smtClean="0"/>
+              <a:t>LaTeX</a:t>
+            </a:r>
+            <a:endParaRPr lang="en-US" dirty="0" smtClean="0"/>
+          </a:p>
+          <a:p>
+            <a:pPr lvl="1"/>
+            <a:r>
+              <a:rPr lang="en-US" dirty="0" smtClean="0"/>
+              <a:t>Getting the rendered PDF back from the executable</a:t>
+            </a:r>
+          </a:p>
+          <a:p>
+            <a:endParaRPr lang="en-US" dirty="0"/>
+          </a:p>
+        </p:txBody>
+      </p:sp>
+    </p:spTree>
+    <p:extLst>
+      <p:ext uri="{BB962C8B-B14F-4D97-AF65-F5344CB8AC3E}">
+        <p14:creationId xmlns:p14="http://schemas.microsoft.com/office/powerpoint/2010/main" val="1093357726"/>
+      </p:ext>
+    </p:extLst>
+  </p:cSld>
+  <p:clrMapOvr>
+    <a:masterClrMapping/>
+  </p:clrMapOvr>
+</p:sld>
+</file>
+
 <file path=ppt/theme/theme1.xml><?xml version="1.0" encoding="utf-8"?>
 <a:theme xmlns:a="http://schemas.openxmlformats.org/drawingml/2006/main" name="Module">
   <a:themeElements>

</xml_diff>